<commit_message>
Added fixed code for bad code example
</commit_message>
<xml_diff>
--- a/lectures/1_intro_cs.pptx
+++ b/lectures/1_intro_cs.pptx
@@ -228,7 +228,7 @@
           <a:p>
             <a:fld id="{15ACD993-6E7C-44B6-876B-3BCBA61CF0FC}" type="datetimeFigureOut">
               <a:rPr lang="en-GB" smtClean="0"/>
-              <a:t>28/08/2019</a:t>
+              <a:t>02/09/2019</a:t>
             </a:fld>
             <a:endParaRPr lang="en-GB"/>
           </a:p>
@@ -2351,7 +2351,7 @@
           <a:p>
             <a:fld id="{0952F4B9-71ED-4A37-A257-4AADC9BBFCB9}" type="datetimeFigureOut">
               <a:rPr lang="en-GB" smtClean="0"/>
-              <a:t>28/08/2019</a:t>
+              <a:t>02/09/2019</a:t>
             </a:fld>
             <a:endParaRPr lang="en-GB"/>
           </a:p>
@@ -2521,7 +2521,7 @@
           <a:p>
             <a:fld id="{0952F4B9-71ED-4A37-A257-4AADC9BBFCB9}" type="datetimeFigureOut">
               <a:rPr lang="en-GB" smtClean="0"/>
-              <a:t>28/08/2019</a:t>
+              <a:t>02/09/2019</a:t>
             </a:fld>
             <a:endParaRPr lang="en-GB"/>
           </a:p>
@@ -2701,7 +2701,7 @@
           <a:p>
             <a:fld id="{0952F4B9-71ED-4A37-A257-4AADC9BBFCB9}" type="datetimeFigureOut">
               <a:rPr lang="en-GB" smtClean="0"/>
-              <a:t>28/08/2019</a:t>
+              <a:t>02/09/2019</a:t>
             </a:fld>
             <a:endParaRPr lang="en-GB"/>
           </a:p>
@@ -2871,7 +2871,7 @@
           <a:p>
             <a:fld id="{0952F4B9-71ED-4A37-A257-4AADC9BBFCB9}" type="datetimeFigureOut">
               <a:rPr lang="en-GB" smtClean="0"/>
-              <a:t>28/08/2019</a:t>
+              <a:t>02/09/2019</a:t>
             </a:fld>
             <a:endParaRPr lang="en-GB"/>
           </a:p>
@@ -3117,7 +3117,7 @@
           <a:p>
             <a:fld id="{0952F4B9-71ED-4A37-A257-4AADC9BBFCB9}" type="datetimeFigureOut">
               <a:rPr lang="en-GB" smtClean="0"/>
-              <a:t>28/08/2019</a:t>
+              <a:t>02/09/2019</a:t>
             </a:fld>
             <a:endParaRPr lang="en-GB"/>
           </a:p>
@@ -3349,7 +3349,7 @@
           <a:p>
             <a:fld id="{0952F4B9-71ED-4A37-A257-4AADC9BBFCB9}" type="datetimeFigureOut">
               <a:rPr lang="en-GB" smtClean="0"/>
-              <a:t>28/08/2019</a:t>
+              <a:t>02/09/2019</a:t>
             </a:fld>
             <a:endParaRPr lang="en-GB"/>
           </a:p>
@@ -3721,7 +3721,7 @@
           <a:p>
             <a:fld id="{0952F4B9-71ED-4A37-A257-4AADC9BBFCB9}" type="datetimeFigureOut">
               <a:rPr lang="en-GB" smtClean="0"/>
-              <a:t>28/08/2019</a:t>
+              <a:t>02/09/2019</a:t>
             </a:fld>
             <a:endParaRPr lang="en-GB"/>
           </a:p>
@@ -3844,7 +3844,7 @@
           <a:p>
             <a:fld id="{0952F4B9-71ED-4A37-A257-4AADC9BBFCB9}" type="datetimeFigureOut">
               <a:rPr lang="en-GB" smtClean="0"/>
-              <a:t>28/08/2019</a:t>
+              <a:t>02/09/2019</a:t>
             </a:fld>
             <a:endParaRPr lang="en-GB"/>
           </a:p>
@@ -3939,7 +3939,7 @@
           <a:p>
             <a:fld id="{0952F4B9-71ED-4A37-A257-4AADC9BBFCB9}" type="datetimeFigureOut">
               <a:rPr lang="en-GB" smtClean="0"/>
-              <a:t>28/08/2019</a:t>
+              <a:t>02/09/2019</a:t>
             </a:fld>
             <a:endParaRPr lang="en-GB"/>
           </a:p>
@@ -4216,7 +4216,7 @@
           <a:p>
             <a:fld id="{0952F4B9-71ED-4A37-A257-4AADC9BBFCB9}" type="datetimeFigureOut">
               <a:rPr lang="en-GB" smtClean="0"/>
-              <a:t>28/08/2019</a:t>
+              <a:t>02/09/2019</a:t>
             </a:fld>
             <a:endParaRPr lang="en-GB"/>
           </a:p>
@@ -4478,7 +4478,7 @@
           <a:p>
             <a:fld id="{0952F4B9-71ED-4A37-A257-4AADC9BBFCB9}" type="datetimeFigureOut">
               <a:rPr lang="en-GB" smtClean="0"/>
-              <a:t>28/08/2019</a:t>
+              <a:t>02/09/2019</a:t>
             </a:fld>
             <a:endParaRPr lang="en-GB"/>
           </a:p>
@@ -4691,7 +4691,7 @@
           <a:p>
             <a:fld id="{0952F4B9-71ED-4A37-A257-4AADC9BBFCB9}" type="datetimeFigureOut">
               <a:rPr lang="en-GB" smtClean="0"/>
-              <a:t>28/08/2019</a:t>
+              <a:t>02/09/2019</a:t>
             </a:fld>
             <a:endParaRPr lang="en-GB"/>
           </a:p>
@@ -6851,6 +6851,14 @@
             </a:r>
           </a:p>
           <a:p>
+            <a:pPr fontAlgn="base"/>
+            <a:r>
+              <a:rPr lang="en-US"/>
+              <a:t>Variables and types</a:t>
+            </a:r>
+            <a:endParaRPr lang="en-US" dirty="0"/>
+          </a:p>
+          <a:p>
             <a:pPr marL="0" indent="0">
               <a:buNone/>
             </a:pPr>
@@ -7031,6 +7039,55 @@
                                           <p:spTgt spid="3">
                                             <p:txEl>
                                               <p:pRg st="2" end="2"/>
+                                            </p:txEl>
+                                          </p:spTgt>
+                                        </p:tgtEl>
+                                        <p:attrNameLst>
+                                          <p:attrName>style.visibility</p:attrName>
+                                        </p:attrNameLst>
+                                      </p:cBhvr>
+                                      <p:to>
+                                        <p:strVal val="visible"/>
+                                      </p:to>
+                                    </p:set>
+                                  </p:childTnLst>
+                                </p:cTn>
+                              </p:par>
+                            </p:childTnLst>
+                          </p:cTn>
+                        </p:par>
+                      </p:childTnLst>
+                    </p:cTn>
+                  </p:par>
+                  <p:par>
+                    <p:cTn id="15" fill="hold">
+                      <p:stCondLst>
+                        <p:cond delay="indefinite"/>
+                      </p:stCondLst>
+                      <p:childTnLst>
+                        <p:par>
+                          <p:cTn id="16" fill="hold">
+                            <p:stCondLst>
+                              <p:cond delay="0"/>
+                            </p:stCondLst>
+                            <p:childTnLst>
+                              <p:par>
+                                <p:cTn id="17" presetID="1" presetClass="entr" presetSubtype="0" fill="hold" grpId="0" nodeType="clickEffect">
+                                  <p:stCondLst>
+                                    <p:cond delay="0"/>
+                                  </p:stCondLst>
+                                  <p:childTnLst>
+                                    <p:set>
+                                      <p:cBhvr>
+                                        <p:cTn id="18" dur="1" fill="hold">
+                                          <p:stCondLst>
+                                            <p:cond delay="0"/>
+                                          </p:stCondLst>
+                                        </p:cTn>
+                                        <p:tgtEl>
+                                          <p:spTgt spid="3">
+                                            <p:txEl>
+                                              <p:pRg st="3" end="3"/>
                                             </p:txEl>
                                           </p:spTgt>
                                         </p:tgtEl>

</xml_diff>